<commit_message>
Minor bug fixes and updates
</commit_message>
<xml_diff>
--- a/research/Video Presentation D1.pptx
+++ b/research/Video Presentation D1.pptx
@@ -5,7 +5,7 @@
     <p:sldMasterId id="2147483648" r:id="rId1"/>
   </p:sldMasterIdLst>
   <p:notesMasterIdLst>
-    <p:notesMasterId r:id="rId35"/>
+    <p:notesMasterId r:id="rId34"/>
   </p:notesMasterIdLst>
   <p:sldIdLst>
     <p:sldId id="256" r:id="rId2"/>
@@ -39,8 +39,7 @@
     <p:sldId id="285" r:id="rId30"/>
     <p:sldId id="286" r:id="rId31"/>
     <p:sldId id="287" r:id="rId32"/>
-    <p:sldId id="288" r:id="rId33"/>
-    <p:sldId id="289" r:id="rId34"/>
+    <p:sldId id="289" r:id="rId33"/>
   </p:sldIdLst>
   <p:sldSz cx="12192000" cy="6858000"/>
   <p:notesSz cx="6858000" cy="9144000"/>
@@ -2828,7 +2827,15 @@
           <a:p>
             <a:r>
               <a:rPr lang="en-GB" dirty="0"/>
-              <a:t>We have seen that machine translation may be effective in creating more training data. Models can transfer some knowledge from public data, but there is a significant drop likely due to differences in article content by country. Models can achieve high accuracy on real-world data but less than on public data, likely because this data can be harder to fit into one category and categories differ by country and by individual source.</a:t>
+              <a:t>We provided two main contributions, developing a system to collect webpage and RSS feed data from multilingual sources, produce real-time visualisations and created an interface to control the system. We also found promise in using machine translation to </a:t>
+            </a:r>
+            <a:r>
+              <a:rPr lang="en-GB" dirty="0" err="1"/>
+              <a:t>upsample</a:t>
+            </a:r>
+            <a:r>
+              <a:rPr lang="en-GB" dirty="0"/>
+              <a:t>, and trained a multilingual model to achieve almost 90% accuracy on real-world data. Thanks for watching</a:t>
             </a:r>
           </a:p>
         </p:txBody>
@@ -2851,101 +2858,6 @@
             <a:fld id="{41D7B854-E06E-4BE9-B363-258F152ECC68}" type="slidenum">
               <a:rPr lang="en-GB" smtClean="0"/>
               <a:t>32</a:t>
-            </a:fld>
-            <a:endParaRPr lang="en-GB"/>
-          </a:p>
-        </p:txBody>
-      </p:sp>
-    </p:spTree>
-    <p:extLst>
-      <p:ext uri="{BB962C8B-B14F-4D97-AF65-F5344CB8AC3E}">
-        <p14:creationId xmlns:p14="http://schemas.microsoft.com/office/powerpoint/2010/main" val="2834256641"/>
-      </p:ext>
-    </p:extLst>
-  </p:cSld>
-  <p:clrMapOvr>
-    <a:masterClrMapping/>
-  </p:clrMapOvr>
-</p:notes>
-</file>
-
-<file path=ppt/notesSlides/notesSlide33.xml><?xml version="1.0" encoding="utf-8"?>
-<p:notes xmlns:a="http://schemas.openxmlformats.org/drawingml/2006/main" xmlns:r="http://schemas.openxmlformats.org/officeDocument/2006/relationships" xmlns:p="http://schemas.openxmlformats.org/presentationml/2006/main">
-  <p:cSld>
-    <p:spTree>
-      <p:nvGrpSpPr>
-        <p:cNvPr id="1" name=""/>
-        <p:cNvGrpSpPr/>
-        <p:nvPr/>
-      </p:nvGrpSpPr>
-      <p:grpSpPr>
-        <a:xfrm>
-          <a:off x="0" y="0"/>
-          <a:ext cx="0" cy="0"/>
-          <a:chOff x="0" y="0"/>
-          <a:chExt cx="0" cy="0"/>
-        </a:xfrm>
-      </p:grpSpPr>
-      <p:sp>
-        <p:nvSpPr>
-          <p:cNvPr id="2" name="Slide Image Placeholder 1"/>
-          <p:cNvSpPr>
-            <a:spLocks noGrp="1" noRot="1" noChangeAspect="1"/>
-          </p:cNvSpPr>
-          <p:nvPr>
-            <p:ph type="sldImg"/>
-          </p:nvPr>
-        </p:nvSpPr>
-        <p:spPr/>
-      </p:sp>
-      <p:sp>
-        <p:nvSpPr>
-          <p:cNvPr id="3" name="Notes Placeholder 2"/>
-          <p:cNvSpPr>
-            <a:spLocks noGrp="1"/>
-          </p:cNvSpPr>
-          <p:nvPr>
-            <p:ph type="body" idx="1"/>
-          </p:nvPr>
-        </p:nvSpPr>
-        <p:spPr/>
-        <p:txBody>
-          <a:bodyPr/>
-          <a:lstStyle/>
-          <a:p>
-            <a:r>
-              <a:rPr lang="en-GB" dirty="0"/>
-              <a:t>We provided two main contributions, developing a system to collect webpage and RSS feed data from multilingual sources, produce real-time visualisations and created an interface to control the system. We also found promise in using machine translation to </a:t>
-            </a:r>
-            <a:r>
-              <a:rPr lang="en-GB" dirty="0" err="1"/>
-              <a:t>upsample</a:t>
-            </a:r>
-            <a:r>
-              <a:rPr lang="en-GB" dirty="0"/>
-              <a:t>, and trained a multilingual model to achieve almost 90% accuracy on real-world data. Thanks for watching</a:t>
-            </a:r>
-          </a:p>
-        </p:txBody>
-      </p:sp>
-      <p:sp>
-        <p:nvSpPr>
-          <p:cNvPr id="4" name="Slide Number Placeholder 3"/>
-          <p:cNvSpPr>
-            <a:spLocks noGrp="1"/>
-          </p:cNvSpPr>
-          <p:nvPr>
-            <p:ph type="sldNum" sz="quarter" idx="5"/>
-          </p:nvPr>
-        </p:nvSpPr>
-        <p:spPr/>
-        <p:txBody>
-          <a:bodyPr/>
-          <a:lstStyle/>
-          <a:p>
-            <a:fld id="{41D7B854-E06E-4BE9-B363-258F152ECC68}" type="slidenum">
-              <a:rPr lang="en-GB" smtClean="0"/>
-              <a:t>33</a:t>
             </a:fld>
             <a:endParaRPr lang="en-GB"/>
           </a:p>
@@ -6782,7 +6694,7 @@
                 <a:ea typeface="Open Sans" pitchFamily="2" charset="0"/>
                 <a:cs typeface="Open Sans" pitchFamily="2" charset="0"/>
               </a:rPr>
-              <a:t>Multilingual News Surveillance and Classification System</a:t>
+              <a:t>A Multilingual News Surveillance and Classification System</a:t>
             </a:r>
           </a:p>
         </p:txBody>
@@ -9254,7 +9166,9 @@
         </p:nvSpPr>
         <p:spPr/>
         <p:txBody>
-          <a:bodyPr/>
+          <a:bodyPr>
+            <a:normAutofit lnSpcReduction="10000"/>
+          </a:bodyPr>
           <a:lstStyle/>
           <a:p>
             <a:r>
@@ -9294,6 +9208,17 @@
           <a:p>
             <a:pPr lvl="1"/>
             <a:r>
+              <a:rPr lang="en-GB" b="1" dirty="0">
+                <a:solidFill>
+                  <a:srgbClr val="50D8AF"/>
+                </a:solidFill>
+                <a:latin typeface="Open Sans" pitchFamily="2" charset="0"/>
+                <a:ea typeface="Open Sans" pitchFamily="2" charset="0"/>
+                <a:cs typeface="Open Sans" pitchFamily="2" charset="0"/>
+              </a:rPr>
+              <a:t>4.44/5</a:t>
+            </a:r>
+            <a:r>
               <a:rPr lang="en-GB" dirty="0">
                 <a:solidFill>
                   <a:srgbClr val="0C2E8A"/>
@@ -9302,6 +9227,42 @@
                 <a:ea typeface="Open Sans" pitchFamily="2" charset="0"/>
                 <a:cs typeface="Open Sans" pitchFamily="2" charset="0"/>
               </a:rPr>
+              <a:t> Easy to understand, </a:t>
+            </a:r>
+            <a:r>
+              <a:rPr lang="en-GB" b="1" dirty="0">
+                <a:solidFill>
+                  <a:srgbClr val="50D8AF"/>
+                </a:solidFill>
+                <a:latin typeface="Open Sans" pitchFamily="2" charset="0"/>
+                <a:ea typeface="Open Sans" pitchFamily="2" charset="0"/>
+                <a:cs typeface="Open Sans" pitchFamily="2" charset="0"/>
+              </a:rPr>
+              <a:t>4.78/5</a:t>
+            </a:r>
+            <a:r>
+              <a:rPr lang="en-GB" dirty="0">
+                <a:solidFill>
+                  <a:srgbClr val="0C2E8A"/>
+                </a:solidFill>
+                <a:latin typeface="Open Sans" pitchFamily="2" charset="0"/>
+                <a:ea typeface="Open Sans" pitchFamily="2" charset="0"/>
+                <a:cs typeface="Open Sans" pitchFamily="2" charset="0"/>
+              </a:rPr>
+              <a:t> Representative of data</a:t>
+            </a:r>
+          </a:p>
+          <a:p>
+            <a:pPr lvl="1"/>
+            <a:r>
+              <a:rPr lang="en-GB" dirty="0">
+                <a:solidFill>
+                  <a:srgbClr val="0C2E8A"/>
+                </a:solidFill>
+                <a:latin typeface="Open Sans" pitchFamily="2" charset="0"/>
+                <a:ea typeface="Open Sans" pitchFamily="2" charset="0"/>
+                <a:cs typeface="Open Sans" pitchFamily="2" charset="0"/>
+              </a:rPr>
               <a:t>Some components difficult to interpret</a:t>
             </a:r>
           </a:p>
@@ -9352,6 +9313,97 @@
                 <a:cs typeface="Open Sans" pitchFamily="2" charset="0"/>
               </a:rPr>
               <a:t>is mostly intuitive and clear, but has some room to improve in aesthetics</a:t>
+            </a:r>
+          </a:p>
+          <a:p>
+            <a:pPr lvl="1"/>
+            <a:r>
+              <a:rPr lang="en-GB" b="1" dirty="0">
+                <a:solidFill>
+                  <a:srgbClr val="50D8AF"/>
+                </a:solidFill>
+                <a:latin typeface="Open Sans" pitchFamily="2" charset="0"/>
+                <a:ea typeface="Open Sans" pitchFamily="2" charset="0"/>
+                <a:cs typeface="Open Sans" pitchFamily="2" charset="0"/>
+              </a:rPr>
+              <a:t>4/5</a:t>
+            </a:r>
+            <a:r>
+              <a:rPr lang="en-GB" dirty="0">
+                <a:solidFill>
+                  <a:srgbClr val="0C2E8A"/>
+                </a:solidFill>
+                <a:latin typeface="Open Sans" pitchFamily="2" charset="0"/>
+                <a:ea typeface="Open Sans" pitchFamily="2" charset="0"/>
+                <a:cs typeface="Open Sans" pitchFamily="2" charset="0"/>
+              </a:rPr>
+              <a:t> Intuitive, </a:t>
+            </a:r>
+            <a:r>
+              <a:rPr lang="en-GB" b="1" dirty="0">
+                <a:solidFill>
+                  <a:srgbClr val="50D8AF"/>
+                </a:solidFill>
+                <a:latin typeface="Open Sans" pitchFamily="2" charset="0"/>
+                <a:ea typeface="Open Sans" pitchFamily="2" charset="0"/>
+                <a:cs typeface="Open Sans" pitchFamily="2" charset="0"/>
+              </a:rPr>
+              <a:t>4.56/5</a:t>
+            </a:r>
+            <a:r>
+              <a:rPr lang="en-GB" dirty="0">
+                <a:solidFill>
+                  <a:srgbClr val="0C2E8A"/>
+                </a:solidFill>
+                <a:latin typeface="Open Sans" pitchFamily="2" charset="0"/>
+                <a:ea typeface="Open Sans" pitchFamily="2" charset="0"/>
+                <a:cs typeface="Open Sans" pitchFamily="2" charset="0"/>
+              </a:rPr>
+              <a:t> Clearly presented, </a:t>
+            </a:r>
+            <a:r>
+              <a:rPr lang="en-GB" dirty="0">
+                <a:solidFill>
+                  <a:srgbClr val="50D8AF"/>
+                </a:solidFill>
+                <a:latin typeface="Open Sans" pitchFamily="2" charset="0"/>
+                <a:ea typeface="Open Sans" pitchFamily="2" charset="0"/>
+                <a:cs typeface="Open Sans" pitchFamily="2" charset="0"/>
+              </a:rPr>
+              <a:t> </a:t>
+            </a:r>
+            <a:r>
+              <a:rPr lang="en-GB" b="1" dirty="0">
+                <a:solidFill>
+                  <a:srgbClr val="50D8AF"/>
+                </a:solidFill>
+                <a:latin typeface="Open Sans" pitchFamily="2" charset="0"/>
+                <a:ea typeface="Open Sans" pitchFamily="2" charset="0"/>
+                <a:cs typeface="Open Sans" pitchFamily="2" charset="0"/>
+              </a:rPr>
+              <a:t>3.89/5</a:t>
+            </a:r>
+            <a:r>
+              <a:rPr lang="en-GB" dirty="0">
+                <a:solidFill>
+                  <a:srgbClr val="50D8AF"/>
+                </a:solidFill>
+                <a:latin typeface="Open Sans" pitchFamily="2" charset="0"/>
+                <a:ea typeface="Open Sans" pitchFamily="2" charset="0"/>
+                <a:cs typeface="Open Sans" pitchFamily="2" charset="0"/>
+              </a:rPr>
+              <a:t> </a:t>
+            </a:r>
+            <a:r>
+              <a:rPr lang="en-GB" dirty="0">
+                <a:solidFill>
+                  <a:srgbClr val="0C2E8A"/>
+                </a:solidFill>
+                <a:latin typeface="Open Sans" pitchFamily="2" charset="0"/>
+                <a:ea typeface="Open Sans" pitchFamily="2" charset="0"/>
+                <a:cs typeface="Open Sans" pitchFamily="2" charset="0"/>
+              </a:rPr>
+              <a:t>aesthetically appealing</a:t>
             </a:r>
           </a:p>
           <a:p>
@@ -11842,203 +11894,6 @@
                 <a:ea typeface="Open Sans" pitchFamily="2" charset="0"/>
                 <a:cs typeface="Open Sans" pitchFamily="2" charset="0"/>
               </a:rPr>
-              <a:t>Conclusions</a:t>
-            </a:r>
-          </a:p>
-        </p:txBody>
-      </p:sp>
-      <p:sp>
-        <p:nvSpPr>
-          <p:cNvPr id="3" name="Content Placeholder 2">
-            <a:extLst>
-              <a:ext uri="{FF2B5EF4-FFF2-40B4-BE49-F238E27FC236}">
-                <a16:creationId xmlns:a16="http://schemas.microsoft.com/office/drawing/2014/main" id="{8792089F-5997-F45A-DAF8-CCBBE566E4EC}"/>
-              </a:ext>
-            </a:extLst>
-          </p:cNvPr>
-          <p:cNvSpPr>
-            <a:spLocks noGrp="1"/>
-          </p:cNvSpPr>
-          <p:nvPr>
-            <p:ph idx="1"/>
-          </p:nvPr>
-        </p:nvSpPr>
-        <p:spPr/>
-        <p:txBody>
-          <a:bodyPr>
-            <a:normAutofit/>
-          </a:bodyPr>
-          <a:lstStyle/>
-          <a:p>
-            <a:r>
-              <a:rPr lang="en-GB" sz="2600" dirty="0">
-                <a:solidFill>
-                  <a:srgbClr val="0C2E8A"/>
-                </a:solidFill>
-                <a:latin typeface="Open Sans" pitchFamily="2" charset="0"/>
-                <a:ea typeface="Open Sans" pitchFamily="2" charset="0"/>
-                <a:cs typeface="Open Sans" pitchFamily="2" charset="0"/>
-              </a:rPr>
-              <a:t>Machine translation provides some promise in </a:t>
-            </a:r>
-            <a:r>
-              <a:rPr lang="en-GB" sz="2600" dirty="0" err="1">
-                <a:solidFill>
-                  <a:srgbClr val="0C2E8A"/>
-                </a:solidFill>
-                <a:latin typeface="Open Sans" pitchFamily="2" charset="0"/>
-                <a:ea typeface="Open Sans" pitchFamily="2" charset="0"/>
-                <a:cs typeface="Open Sans" pitchFamily="2" charset="0"/>
-              </a:rPr>
-              <a:t>upsampling</a:t>
-            </a:r>
-            <a:endParaRPr lang="en-GB" sz="2600" dirty="0">
-              <a:solidFill>
-                <a:srgbClr val="0C2E8A"/>
-              </a:solidFill>
-              <a:latin typeface="Open Sans" pitchFamily="2" charset="0"/>
-              <a:ea typeface="Open Sans" pitchFamily="2" charset="0"/>
-              <a:cs typeface="Open Sans" pitchFamily="2" charset="0"/>
-            </a:endParaRPr>
-          </a:p>
-          <a:p>
-            <a:r>
-              <a:rPr lang="en-GB" sz="2600" dirty="0">
-                <a:solidFill>
-                  <a:srgbClr val="0C2E8A"/>
-                </a:solidFill>
-                <a:latin typeface="Open Sans" pitchFamily="2" charset="0"/>
-                <a:ea typeface="Open Sans" pitchFamily="2" charset="0"/>
-                <a:cs typeface="Open Sans" pitchFamily="2" charset="0"/>
-              </a:rPr>
-              <a:t>Models can transfer, but lose some accuracy</a:t>
-            </a:r>
-          </a:p>
-          <a:p>
-            <a:pPr lvl="1"/>
-            <a:r>
-              <a:rPr lang="en-GB" sz="1800" dirty="0">
-                <a:solidFill>
-                  <a:srgbClr val="0C2E8A"/>
-                </a:solidFill>
-                <a:latin typeface="Open Sans" pitchFamily="2" charset="0"/>
-                <a:ea typeface="Open Sans" pitchFamily="2" charset="0"/>
-                <a:cs typeface="Open Sans" pitchFamily="2" charset="0"/>
-              </a:rPr>
-              <a:t>Could be difference in article content across country</a:t>
-            </a:r>
-          </a:p>
-          <a:p>
-            <a:r>
-              <a:rPr lang="en-GB" sz="2200" dirty="0">
-                <a:solidFill>
-                  <a:srgbClr val="0C2E8A"/>
-                </a:solidFill>
-                <a:latin typeface="Open Sans" pitchFamily="2" charset="0"/>
-                <a:ea typeface="Open Sans" pitchFamily="2" charset="0"/>
-                <a:cs typeface="Open Sans" pitchFamily="2" charset="0"/>
-              </a:rPr>
-              <a:t>Models can effectively classify real-world data, but lose accuracy over public data</a:t>
-            </a:r>
-          </a:p>
-          <a:p>
-            <a:pPr lvl="1"/>
-            <a:r>
-              <a:rPr lang="en-GB" sz="1800" dirty="0">
-                <a:solidFill>
-                  <a:srgbClr val="0C2E8A"/>
-                </a:solidFill>
-                <a:latin typeface="Open Sans" pitchFamily="2" charset="0"/>
-                <a:ea typeface="Open Sans" pitchFamily="2" charset="0"/>
-                <a:cs typeface="Open Sans" pitchFamily="2" charset="0"/>
-              </a:rPr>
-              <a:t>Real-world data can be harder to categorise</a:t>
-            </a:r>
-          </a:p>
-          <a:p>
-            <a:pPr lvl="1"/>
-            <a:r>
-              <a:rPr lang="en-GB" sz="1800" dirty="0">
-                <a:solidFill>
-                  <a:srgbClr val="0C2E8A"/>
-                </a:solidFill>
-                <a:latin typeface="Open Sans" pitchFamily="2" charset="0"/>
-                <a:ea typeface="Open Sans" pitchFamily="2" charset="0"/>
-                <a:cs typeface="Open Sans" pitchFamily="2" charset="0"/>
-              </a:rPr>
-              <a:t>Categories can differ by country and source</a:t>
-            </a:r>
-            <a:endParaRPr lang="en-GB" sz="1400" dirty="0">
-              <a:solidFill>
-                <a:srgbClr val="0C2E8A"/>
-              </a:solidFill>
-              <a:latin typeface="Open Sans" pitchFamily="2" charset="0"/>
-              <a:ea typeface="Open Sans" pitchFamily="2" charset="0"/>
-              <a:cs typeface="Open Sans" pitchFamily="2" charset="0"/>
-            </a:endParaRPr>
-          </a:p>
-        </p:txBody>
-      </p:sp>
-    </p:spTree>
-    <p:extLst>
-      <p:ext uri="{BB962C8B-B14F-4D97-AF65-F5344CB8AC3E}">
-        <p14:creationId xmlns:p14="http://schemas.microsoft.com/office/powerpoint/2010/main" val="4116598298"/>
-      </p:ext>
-    </p:extLst>
-  </p:cSld>
-  <p:clrMapOvr>
-    <a:masterClrMapping/>
-  </p:clrMapOvr>
-</p:sld>
-</file>
-
-<file path=ppt/slides/slide33.xml><?xml version="1.0" encoding="utf-8"?>
-<p:sld xmlns:a="http://schemas.openxmlformats.org/drawingml/2006/main" xmlns:r="http://schemas.openxmlformats.org/officeDocument/2006/relationships" xmlns:p="http://schemas.openxmlformats.org/presentationml/2006/main">
-  <p:cSld>
-    <p:spTree>
-      <p:nvGrpSpPr>
-        <p:cNvPr id="1" name=""/>
-        <p:cNvGrpSpPr/>
-        <p:nvPr/>
-      </p:nvGrpSpPr>
-      <p:grpSpPr>
-        <a:xfrm>
-          <a:off x="0" y="0"/>
-          <a:ext cx="0" cy="0"/>
-          <a:chOff x="0" y="0"/>
-          <a:chExt cx="0" cy="0"/>
-        </a:xfrm>
-      </p:grpSpPr>
-      <p:sp>
-        <p:nvSpPr>
-          <p:cNvPr id="2" name="Title 1">
-            <a:extLst>
-              <a:ext uri="{FF2B5EF4-FFF2-40B4-BE49-F238E27FC236}">
-                <a16:creationId xmlns:a16="http://schemas.microsoft.com/office/drawing/2014/main" id="{DEAE4C3F-285D-FA36-0590-292F30F27FC6}"/>
-              </a:ext>
-            </a:extLst>
-          </p:cNvPr>
-          <p:cNvSpPr>
-            <a:spLocks noGrp="1"/>
-          </p:cNvSpPr>
-          <p:nvPr>
-            <p:ph type="title"/>
-          </p:nvPr>
-        </p:nvSpPr>
-        <p:spPr/>
-        <p:txBody>
-          <a:bodyPr/>
-          <a:lstStyle/>
-          <a:p>
-            <a:r>
-              <a:rPr lang="en-GB" b="1" dirty="0">
-                <a:solidFill>
-                  <a:srgbClr val="0C2E8A"/>
-                </a:solidFill>
-                <a:latin typeface="Open Sans" pitchFamily="2" charset="0"/>
-                <a:ea typeface="Open Sans" pitchFamily="2" charset="0"/>
-                <a:cs typeface="Open Sans" pitchFamily="2" charset="0"/>
-              </a:rPr>
               <a:t>Summary</a:t>
             </a:r>
           </a:p>
@@ -12112,10 +11967,71 @@
                 <a:ea typeface="Open Sans" pitchFamily="2" charset="0"/>
                 <a:cs typeface="Open Sans" pitchFamily="2" charset="0"/>
               </a:rPr>
+              <a:t>Classify results into category</a:t>
+            </a:r>
+          </a:p>
+          <a:p>
+            <a:pPr lvl="1"/>
+            <a:r>
+              <a:rPr lang="en-GB" sz="2200" dirty="0">
+                <a:solidFill>
+                  <a:srgbClr val="0C2E8A"/>
+                </a:solidFill>
+                <a:latin typeface="Open Sans" pitchFamily="2" charset="0"/>
+                <a:ea typeface="Open Sans" pitchFamily="2" charset="0"/>
+                <a:cs typeface="Open Sans" pitchFamily="2" charset="0"/>
+              </a:rPr>
               <a:t>Produce visualisations from article data</a:t>
             </a:r>
           </a:p>
           <a:p>
+            <a:pPr lvl="2"/>
+            <a:r>
+              <a:rPr lang="en-GB" sz="1800" b="1" dirty="0">
+                <a:solidFill>
+                  <a:srgbClr val="50D8AF"/>
+                </a:solidFill>
+                <a:latin typeface="Open Sans" pitchFamily="2" charset="0"/>
+                <a:ea typeface="Open Sans" pitchFamily="2" charset="0"/>
+                <a:cs typeface="Open Sans" pitchFamily="2" charset="0"/>
+              </a:rPr>
+              <a:t>4.44/5</a:t>
+            </a:r>
+            <a:r>
+              <a:rPr lang="en-GB" sz="1800" dirty="0">
+                <a:solidFill>
+                  <a:srgbClr val="0C2E8A"/>
+                </a:solidFill>
+                <a:latin typeface="Open Sans" pitchFamily="2" charset="0"/>
+                <a:ea typeface="Open Sans" pitchFamily="2" charset="0"/>
+                <a:cs typeface="Open Sans" pitchFamily="2" charset="0"/>
+              </a:rPr>
+              <a:t> Easy to understand, </a:t>
+            </a:r>
+            <a:r>
+              <a:rPr lang="en-GB" sz="1800" b="1" dirty="0">
+                <a:solidFill>
+                  <a:srgbClr val="50D8AF"/>
+                </a:solidFill>
+                <a:latin typeface="Open Sans" pitchFamily="2" charset="0"/>
+                <a:ea typeface="Open Sans" pitchFamily="2" charset="0"/>
+                <a:cs typeface="Open Sans" pitchFamily="2" charset="0"/>
+              </a:rPr>
+              <a:t>4.78/5</a:t>
+            </a:r>
+            <a:r>
+              <a:rPr lang="en-GB" sz="1800" dirty="0">
+                <a:solidFill>
+                  <a:srgbClr val="0C2E8A"/>
+                </a:solidFill>
+                <a:latin typeface="Open Sans" pitchFamily="2" charset="0"/>
+                <a:ea typeface="Open Sans" pitchFamily="2" charset="0"/>
+                <a:cs typeface="Open Sans" pitchFamily="2" charset="0"/>
+              </a:rPr>
+              <a:t> Representative of data</a:t>
+            </a:r>
+          </a:p>
+          <a:p>
             <a:pPr lvl="1"/>
             <a:r>
               <a:rPr lang="en-GB" sz="2200" dirty="0">
@@ -12130,6 +12046,97 @@
             </a:r>
           </a:p>
           <a:p>
+            <a:pPr lvl="2"/>
+            <a:r>
+              <a:rPr lang="en-GB" sz="1800" b="1" dirty="0">
+                <a:solidFill>
+                  <a:srgbClr val="50D8AF"/>
+                </a:solidFill>
+                <a:latin typeface="Open Sans" pitchFamily="2" charset="0"/>
+                <a:ea typeface="Open Sans" pitchFamily="2" charset="0"/>
+                <a:cs typeface="Open Sans" pitchFamily="2" charset="0"/>
+              </a:rPr>
+              <a:t>4/5</a:t>
+            </a:r>
+            <a:r>
+              <a:rPr lang="en-GB" sz="1800" dirty="0">
+                <a:solidFill>
+                  <a:srgbClr val="0C2E8A"/>
+                </a:solidFill>
+                <a:latin typeface="Open Sans" pitchFamily="2" charset="0"/>
+                <a:ea typeface="Open Sans" pitchFamily="2" charset="0"/>
+                <a:cs typeface="Open Sans" pitchFamily="2" charset="0"/>
+              </a:rPr>
+              <a:t> Intuitive, </a:t>
+            </a:r>
+            <a:r>
+              <a:rPr lang="en-GB" sz="1800" b="1" dirty="0">
+                <a:solidFill>
+                  <a:srgbClr val="50D8AF"/>
+                </a:solidFill>
+                <a:latin typeface="Open Sans" pitchFamily="2" charset="0"/>
+                <a:ea typeface="Open Sans" pitchFamily="2" charset="0"/>
+                <a:cs typeface="Open Sans" pitchFamily="2" charset="0"/>
+              </a:rPr>
+              <a:t>4.56/5</a:t>
+            </a:r>
+            <a:r>
+              <a:rPr lang="en-GB" sz="1800" dirty="0">
+                <a:solidFill>
+                  <a:srgbClr val="0C2E8A"/>
+                </a:solidFill>
+                <a:latin typeface="Open Sans" pitchFamily="2" charset="0"/>
+                <a:ea typeface="Open Sans" pitchFamily="2" charset="0"/>
+                <a:cs typeface="Open Sans" pitchFamily="2" charset="0"/>
+              </a:rPr>
+              <a:t> Clearly presented, </a:t>
+            </a:r>
+            <a:r>
+              <a:rPr lang="en-GB" sz="1800" dirty="0">
+                <a:solidFill>
+                  <a:srgbClr val="50D8AF"/>
+                </a:solidFill>
+                <a:latin typeface="Open Sans" pitchFamily="2" charset="0"/>
+                <a:ea typeface="Open Sans" pitchFamily="2" charset="0"/>
+                <a:cs typeface="Open Sans" pitchFamily="2" charset="0"/>
+              </a:rPr>
+              <a:t> </a:t>
+            </a:r>
+            <a:r>
+              <a:rPr lang="en-GB" sz="1800" b="1" dirty="0">
+                <a:solidFill>
+                  <a:srgbClr val="50D8AF"/>
+                </a:solidFill>
+                <a:latin typeface="Open Sans" pitchFamily="2" charset="0"/>
+                <a:ea typeface="Open Sans" pitchFamily="2" charset="0"/>
+                <a:cs typeface="Open Sans" pitchFamily="2" charset="0"/>
+              </a:rPr>
+              <a:t>3.89/5</a:t>
+            </a:r>
+            <a:r>
+              <a:rPr lang="en-GB" sz="1800" dirty="0">
+                <a:solidFill>
+                  <a:srgbClr val="50D8AF"/>
+                </a:solidFill>
+                <a:latin typeface="Open Sans" pitchFamily="2" charset="0"/>
+                <a:ea typeface="Open Sans" pitchFamily="2" charset="0"/>
+                <a:cs typeface="Open Sans" pitchFamily="2" charset="0"/>
+              </a:rPr>
+              <a:t> </a:t>
+            </a:r>
+            <a:r>
+              <a:rPr lang="en-GB" sz="1800" dirty="0">
+                <a:solidFill>
+                  <a:srgbClr val="0C2E8A"/>
+                </a:solidFill>
+                <a:latin typeface="Open Sans" pitchFamily="2" charset="0"/>
+                <a:ea typeface="Open Sans" pitchFamily="2" charset="0"/>
+                <a:cs typeface="Open Sans" pitchFamily="2" charset="0"/>
+              </a:rPr>
+              <a:t>aesthetically appealing</a:t>
+            </a:r>
+          </a:p>
+          <a:p>
             <a:r>
               <a:rPr lang="en-GB" sz="2600" b="1" dirty="0">
                 <a:solidFill>
@@ -12166,14 +12173,17 @@
               </a:rPr>
               <a:t>upsample</a:t>
             </a:r>
-            <a:endParaRPr lang="en-GB" sz="2200" dirty="0">
-              <a:solidFill>
-                <a:srgbClr val="0C2E8A"/>
-              </a:solidFill>
-              <a:latin typeface="Open Sans" pitchFamily="2" charset="0"/>
-              <a:ea typeface="Open Sans" pitchFamily="2" charset="0"/>
-              <a:cs typeface="Open Sans" pitchFamily="2" charset="0"/>
-            </a:endParaRPr>
+            <a:r>
+              <a:rPr lang="en-GB" sz="2200" dirty="0">
+                <a:solidFill>
+                  <a:srgbClr val="0C2E8A"/>
+                </a:solidFill>
+                <a:latin typeface="Open Sans" pitchFamily="2" charset="0"/>
+                <a:ea typeface="Open Sans" pitchFamily="2" charset="0"/>
+                <a:cs typeface="Open Sans" pitchFamily="2" charset="0"/>
+              </a:rPr>
+              <a:t> data</a:t>
+            </a:r>
           </a:p>
           <a:p>
             <a:pPr lvl="1"/>
@@ -12186,7 +12196,29 @@
                 <a:ea typeface="Open Sans" pitchFamily="2" charset="0"/>
                 <a:cs typeface="Open Sans" pitchFamily="2" charset="0"/>
               </a:rPr>
-              <a:t>Multilingual models can achieve high (~89%) accuracy on real-world data</a:t>
+              <a:t>Multilingual models can achieve high </a:t>
+            </a:r>
+            <a:r>
+              <a:rPr lang="en-GB" sz="2200" b="1" dirty="0">
+                <a:solidFill>
+                  <a:srgbClr val="50D8AF"/>
+                </a:solidFill>
+                <a:latin typeface="Open Sans" pitchFamily="2" charset="0"/>
+                <a:ea typeface="Open Sans" pitchFamily="2" charset="0"/>
+                <a:cs typeface="Open Sans" pitchFamily="2" charset="0"/>
+              </a:rPr>
+              <a:t>(~89%) </a:t>
+            </a:r>
+            <a:r>
+              <a:rPr lang="en-GB" sz="2200" dirty="0">
+                <a:solidFill>
+                  <a:srgbClr val="0C2E8A"/>
+                </a:solidFill>
+                <a:latin typeface="Open Sans" pitchFamily="2" charset="0"/>
+                <a:ea typeface="Open Sans" pitchFamily="2" charset="0"/>
+                <a:cs typeface="Open Sans" pitchFamily="2" charset="0"/>
+              </a:rPr>
+              <a:t>accuracy on real-world data</a:t>
             </a:r>
           </a:p>
         </p:txBody>
@@ -12719,45 +12751,6 @@
           </a:xfrm>
         </p:spPr>
       </p:pic>
-      <p:sp>
-        <p:nvSpPr>
-          <p:cNvPr id="8" name="TextBox 7">
-            <a:extLst>
-              <a:ext uri="{FF2B5EF4-FFF2-40B4-BE49-F238E27FC236}">
-                <a16:creationId xmlns:a16="http://schemas.microsoft.com/office/drawing/2014/main" id="{B535F1C7-68DB-2133-8DC2-BCB2A872CBF1}"/>
-              </a:ext>
-            </a:extLst>
-          </p:cNvPr>
-          <p:cNvSpPr txBox="1"/>
-          <p:nvPr/>
-        </p:nvSpPr>
-        <p:spPr>
-          <a:xfrm>
-            <a:off x="960120" y="1690688"/>
-            <a:ext cx="438912" cy="369332"/>
-          </a:xfrm>
-          <a:prstGeom prst="rect">
-            <a:avLst/>
-          </a:prstGeom>
-          <a:noFill/>
-        </p:spPr>
-        <p:txBody>
-          <a:bodyPr wrap="square" rtlCol="0">
-            <a:spAutoFit/>
-          </a:bodyPr>
-          <a:lstStyle/>
-          <a:p>
-            <a:r>
-              <a:rPr lang="en-GB" dirty="0">
-                <a:solidFill>
-                  <a:srgbClr val="2F8042"/>
-                </a:solidFill>
-              </a:rPr>
-              <a:t>t</a:t>
-            </a:r>
-          </a:p>
-        </p:txBody>
-      </p:sp>
     </p:spTree>
     <p:extLst>
       <p:ext uri="{BB962C8B-B14F-4D97-AF65-F5344CB8AC3E}">

</xml_diff>